<commit_message>
Added Peter as a co-founder so I don't get in trouble.
</commit_message>
<xml_diff>
--- a/InVEST_intro_TNC_Oct21_2011.pptx
+++ b/InVEST_intro_TNC_Oct21_2011.pptx
@@ -261,7 +261,7 @@
               <a:pPr>
                 <a:defRPr/>
               </a:pPr>
-              <a:t>10/20/2011</a:t>
+              <a:t>10/24/2011</a:t>
             </a:fld>
             <a:endParaRPr lang="en-US"/>
           </a:p>
@@ -1050,7 +1050,7 @@
               <a:pPr>
                 <a:defRPr/>
               </a:pPr>
-              <a:t>10/20/2011</a:t>
+              <a:t>10/24/2011</a:t>
             </a:fld>
             <a:endParaRPr lang="en-US"/>
           </a:p>
@@ -1247,7 +1247,7 @@
               <a:pPr>
                 <a:defRPr/>
               </a:pPr>
-              <a:t>10/20/2011</a:t>
+              <a:t>10/24/2011</a:t>
             </a:fld>
             <a:endParaRPr lang="en-US"/>
           </a:p>
@@ -1454,7 +1454,7 @@
               <a:pPr>
                 <a:defRPr/>
               </a:pPr>
-              <a:t>10/20/2011</a:t>
+              <a:t>10/24/2011</a:t>
             </a:fld>
             <a:endParaRPr lang="en-US"/>
           </a:p>
@@ -1576,7 +1576,7 @@
               <a:pPr>
                 <a:defRPr/>
               </a:pPr>
-              <a:t>10/20/2011</a:t>
+              <a:t>10/24/2011</a:t>
             </a:fld>
             <a:endParaRPr lang="en-US"/>
           </a:p>
@@ -1849,7 +1849,7 @@
               <a:pPr>
                 <a:defRPr/>
               </a:pPr>
-              <a:t>10/20/2011</a:t>
+              <a:t>10/24/2011</a:t>
             </a:fld>
             <a:endParaRPr lang="en-US"/>
           </a:p>
@@ -2164,7 +2164,7 @@
               <a:pPr>
                 <a:defRPr/>
               </a:pPr>
-              <a:t>10/20/2011</a:t>
+              <a:t>10/24/2011</a:t>
             </a:fld>
             <a:endParaRPr lang="en-US"/>
           </a:p>
@@ -2613,7 +2613,7 @@
               <a:pPr>
                 <a:defRPr/>
               </a:pPr>
-              <a:t>10/20/2011</a:t>
+              <a:t>10/24/2011</a:t>
             </a:fld>
             <a:endParaRPr lang="en-US"/>
           </a:p>
@@ -2758,7 +2758,7 @@
               <a:pPr>
                 <a:defRPr/>
               </a:pPr>
-              <a:t>10/20/2011</a:t>
+              <a:t>10/24/2011</a:t>
             </a:fld>
             <a:endParaRPr lang="en-US"/>
           </a:p>
@@ -2880,7 +2880,7 @@
               <a:pPr>
                 <a:defRPr/>
               </a:pPr>
-              <a:t>10/20/2011</a:t>
+              <a:t>10/24/2011</a:t>
             </a:fld>
             <a:endParaRPr lang="en-US"/>
           </a:p>
@@ -3184,7 +3184,7 @@
               <a:pPr>
                 <a:defRPr/>
               </a:pPr>
-              <a:t>10/20/2011</a:t>
+              <a:t>10/24/2011</a:t>
             </a:fld>
             <a:endParaRPr lang="en-US"/>
           </a:p>
@@ -3471,7 +3471,7 @@
               <a:pPr>
                 <a:defRPr/>
               </a:pPr>
-              <a:t>10/20/2011</a:t>
+              <a:t>10/24/2011</a:t>
             </a:fld>
             <a:endParaRPr lang="en-US"/>
           </a:p>
@@ -3763,7 +3763,7 @@
               <a:pPr>
                 <a:defRPr/>
               </a:pPr>
-              <a:t>10/20/2011</a:t>
+              <a:t>10/24/2011</a:t>
             </a:fld>
             <a:endParaRPr lang="en-US"/>
           </a:p>
@@ -7738,16 +7738,7 @@
                 </a:solidFill>
                 <a:latin typeface="+mn-lt"/>
               </a:rPr>
-              <a:t> </a:t>
-            </a:r>
-            <a:r>
-              <a:rPr lang="en-US" sz="4000" b="1" dirty="0" smtClean="0">
-                <a:solidFill>
-                  <a:schemeClr val="bg1"/>
-                </a:solidFill>
-                <a:latin typeface="+mn-lt"/>
-              </a:rPr>
-              <a:t>Models We’ll Cover</a:t>
+              <a:t> Models We’ll Cover</a:t>
             </a:r>
             <a:endParaRPr lang="en-US" sz="4000" b="1" dirty="0">
               <a:solidFill>
@@ -7934,12 +7925,6 @@
               </a:rPr>
               <a:t>’ folder to your desktop</a:t>
             </a:r>
-            <a:endParaRPr lang="en-US" sz="2400" dirty="0" smtClean="0">
-              <a:solidFill>
-                <a:schemeClr val="bg1"/>
-              </a:solidFill>
-              <a:latin typeface="+mn-lt"/>
-            </a:endParaRPr>
           </a:p>
           <a:p>
             <a:pPr marL="342900" indent="-342900">
@@ -8114,12 +8099,6 @@
               </a:rPr>
               <a:t>…</a:t>
             </a:r>
-            <a:endParaRPr lang="en-US" sz="2400" dirty="0" smtClean="0">
-              <a:solidFill>
-                <a:schemeClr val="bg1"/>
-              </a:solidFill>
-              <a:latin typeface="+mn-lt"/>
-            </a:endParaRPr>
           </a:p>
           <a:p>
             <a:pPr marL="342900" indent="-342900">
@@ -9314,19 +9293,55 @@
               <a:rPr lang="en-US" sz="2400" dirty="0" smtClean="0">
                 <a:latin typeface="Calibri" pitchFamily="34" charset="0"/>
               </a:rPr>
-              <a:t>Co-founded by Gretchen Daily, Steve </a:t>
+              <a:t>Co-founded by Gretchen Daily, </a:t>
+            </a:r>
+            <a:r>
+              <a:rPr lang="en-US" sz="2400" dirty="0" smtClean="0">
+                <a:latin typeface="Calibri" pitchFamily="34" charset="0"/>
+              </a:rPr>
+              <a:t>Peter </a:t>
             </a:r>
             <a:r>
               <a:rPr lang="en-US" sz="2400" dirty="0" err="1" smtClean="0">
                 <a:latin typeface="Calibri" pitchFamily="34" charset="0"/>
               </a:rPr>
-              <a:t>Polasky</a:t>
+              <a:t>Kareiva</a:t>
             </a:r>
             <a:r>
               <a:rPr lang="en-US" sz="2400" dirty="0" smtClean="0">
                 <a:latin typeface="Calibri" pitchFamily="34" charset="0"/>
               </a:rPr>
-              <a:t>, and Taylor Ricketts, directed by Mary Ruckelshaus</a:t>
+              <a:t>, Taylor </a:t>
+            </a:r>
+            <a:r>
+              <a:rPr lang="en-US" sz="2400" dirty="0" smtClean="0">
+                <a:latin typeface="Calibri" pitchFamily="34" charset="0"/>
+              </a:rPr>
+              <a:t>Ricketts</a:t>
+            </a:r>
+            <a:r>
+              <a:rPr lang="en-US" sz="2400" dirty="0">
+                <a:latin typeface="Calibri" pitchFamily="34" charset="0"/>
+              </a:rPr>
+              <a:t>, and Steve </a:t>
+            </a:r>
+            <a:r>
+              <a:rPr lang="en-US" sz="2400" dirty="0" err="1" smtClean="0">
+                <a:latin typeface="Calibri" pitchFamily="34" charset="0"/>
+              </a:rPr>
+              <a:t>Polasky</a:t>
+            </a:r>
+            <a:r>
+              <a:rPr lang="en-US" sz="2400" dirty="0" smtClean="0">
+                <a:latin typeface="Calibri" pitchFamily="34" charset="0"/>
+              </a:rPr>
+              <a:t>; </a:t>
+            </a:r>
+            <a:r>
+              <a:rPr lang="en-US" sz="2400" dirty="0" smtClean="0">
+                <a:latin typeface="Calibri" pitchFamily="34" charset="0"/>
+              </a:rPr>
+              <a:t>directed by Mary Ruckelshaus</a:t>
             </a:r>
           </a:p>
           <a:p>

</xml_diff>